<commit_message>
modift 1st report - add team number
</commit_message>
<xml_diff>
--- a/doc/reports/캡스톤 1차 발표 자료.pptx
+++ b/doc/reports/캡스톤 1차 발표 자료.pptx
@@ -3475,6 +3475,64 @@
               <a:t>위붕우</a:t>
             </a:r>
             <a:endParaRPr lang="ko-KR" altLang="en-US" dirty="0"/>
+          </a:p>
+        </p:txBody>
+      </p:sp>
+      <p:sp>
+        <p:nvSpPr>
+          <p:cNvPr id="4" name="제목 1">
+            <a:extLst>
+              <a:ext uri="{FF2B5EF4-FFF2-40B4-BE49-F238E27FC236}">
+                <a16:creationId xmlns:a16="http://schemas.microsoft.com/office/drawing/2014/main" id="{75D24ED3-5723-498E-82C5-558D3797EA3B}"/>
+              </a:ext>
+            </a:extLst>
+          </p:cNvPr>
+          <p:cNvSpPr txBox="1">
+            <a:spLocks/>
+          </p:cNvSpPr>
+          <p:nvPr/>
+        </p:nvSpPr>
+        <p:spPr>
+          <a:xfrm>
+            <a:off x="4435792" y="447819"/>
+            <a:ext cx="3320415" cy="2512436"/>
+          </a:xfrm>
+          <a:prstGeom prst="rect">
+            <a:avLst/>
+          </a:prstGeom>
+        </p:spPr>
+        <p:txBody>
+          <a:bodyPr vert="horz" lIns="91440" tIns="45720" rIns="91440" bIns="45720" rtlCol="0" anchor="b">
+            <a:normAutofit/>
+          </a:bodyPr>
+          <a:lstStyle>
+            <a:lvl1pPr algn="ctr" defTabSz="914400" rtl="0" eaLnBrk="1" latinLnBrk="1" hangingPunct="1">
+              <a:lnSpc>
+                <a:spcPct val="90000"/>
+              </a:lnSpc>
+              <a:spcBef>
+                <a:spcPct val="0"/>
+              </a:spcBef>
+              <a:buNone/>
+              <a:defRPr sz="6000" kern="1200">
+                <a:solidFill>
+                  <a:schemeClr val="tx1"/>
+                </a:solidFill>
+                <a:latin typeface="+mj-lt"/>
+                <a:ea typeface="+mj-ea"/>
+                <a:cs typeface="+mj-cs"/>
+              </a:defRPr>
+            </a:lvl1pPr>
+          </a:lstStyle>
+          <a:p>
+            <a:r>
+              <a:rPr lang="en-US" altLang="ko-KR" sz="9600" b="1" dirty="0"/>
+              <a:t>14</a:t>
+            </a:r>
+            <a:r>
+              <a:rPr lang="ko-KR" altLang="en-US" sz="9600" b="1" dirty="0"/>
+              <a:t>조</a:t>
+            </a:r>
           </a:p>
         </p:txBody>
       </p:sp>

</xml_diff>